<commit_message>
fix (get-started): proofread and correct
related to #CAM-5049, CAM-5040
</commit_message>
<xml_diff>
--- a/get-started/develop/drawings/get-started-bpmn.pptx
+++ b/get-started/develop/drawings/get-started-bpmn.pptx
@@ -251,7 +251,7 @@
           <a:p>
             <a:fld id="{1EEAD7B0-9864-4916-91ED-B8C0F774584E}" type="datetimeFigureOut">
               <a:rPr lang="de-DE" smtClean="0"/>
-              <a:t>27.11.2015</a:t>
+              <a:t>02.12.2015</a:t>
             </a:fld>
             <a:endParaRPr lang="de-DE"/>
           </a:p>
@@ -421,7 +421,7 @@
           <a:p>
             <a:fld id="{1EEAD7B0-9864-4916-91ED-B8C0F774584E}" type="datetimeFigureOut">
               <a:rPr lang="de-DE" smtClean="0"/>
-              <a:t>27.11.2015</a:t>
+              <a:t>02.12.2015</a:t>
             </a:fld>
             <a:endParaRPr lang="de-DE"/>
           </a:p>
@@ -601,7 +601,7 @@
           <a:p>
             <a:fld id="{1EEAD7B0-9864-4916-91ED-B8C0F774584E}" type="datetimeFigureOut">
               <a:rPr lang="de-DE" smtClean="0"/>
-              <a:t>27.11.2015</a:t>
+              <a:t>02.12.2015</a:t>
             </a:fld>
             <a:endParaRPr lang="de-DE"/>
           </a:p>
@@ -771,7 +771,7 @@
           <a:p>
             <a:fld id="{1EEAD7B0-9864-4916-91ED-B8C0F774584E}" type="datetimeFigureOut">
               <a:rPr lang="de-DE" smtClean="0"/>
-              <a:t>27.11.2015</a:t>
+              <a:t>02.12.2015</a:t>
             </a:fld>
             <a:endParaRPr lang="de-DE"/>
           </a:p>
@@ -1017,7 +1017,7 @@
           <a:p>
             <a:fld id="{1EEAD7B0-9864-4916-91ED-B8C0F774584E}" type="datetimeFigureOut">
               <a:rPr lang="de-DE" smtClean="0"/>
-              <a:t>27.11.2015</a:t>
+              <a:t>02.12.2015</a:t>
             </a:fld>
             <a:endParaRPr lang="de-DE"/>
           </a:p>
@@ -1249,7 +1249,7 @@
           <a:p>
             <a:fld id="{1EEAD7B0-9864-4916-91ED-B8C0F774584E}" type="datetimeFigureOut">
               <a:rPr lang="de-DE" smtClean="0"/>
-              <a:t>27.11.2015</a:t>
+              <a:t>02.12.2015</a:t>
             </a:fld>
             <a:endParaRPr lang="de-DE"/>
           </a:p>
@@ -1616,7 +1616,7 @@
           <a:p>
             <a:fld id="{1EEAD7B0-9864-4916-91ED-B8C0F774584E}" type="datetimeFigureOut">
               <a:rPr lang="de-DE" smtClean="0"/>
-              <a:t>27.11.2015</a:t>
+              <a:t>02.12.2015</a:t>
             </a:fld>
             <a:endParaRPr lang="de-DE"/>
           </a:p>
@@ -1734,7 +1734,7 @@
           <a:p>
             <a:fld id="{1EEAD7B0-9864-4916-91ED-B8C0F774584E}" type="datetimeFigureOut">
               <a:rPr lang="de-DE" smtClean="0"/>
-              <a:t>27.11.2015</a:t>
+              <a:t>02.12.2015</a:t>
             </a:fld>
             <a:endParaRPr lang="de-DE"/>
           </a:p>
@@ -1829,7 +1829,7 @@
           <a:p>
             <a:fld id="{1EEAD7B0-9864-4916-91ED-B8C0F774584E}" type="datetimeFigureOut">
               <a:rPr lang="de-DE" smtClean="0"/>
-              <a:t>27.11.2015</a:t>
+              <a:t>02.12.2015</a:t>
             </a:fld>
             <a:endParaRPr lang="de-DE"/>
           </a:p>
@@ -2106,7 +2106,7 @@
           <a:p>
             <a:fld id="{1EEAD7B0-9864-4916-91ED-B8C0F774584E}" type="datetimeFigureOut">
               <a:rPr lang="de-DE" smtClean="0"/>
-              <a:t>27.11.2015</a:t>
+              <a:t>02.12.2015</a:t>
             </a:fld>
             <a:endParaRPr lang="de-DE"/>
           </a:p>
@@ -2359,7 +2359,7 @@
           <a:p>
             <a:fld id="{1EEAD7B0-9864-4916-91ED-B8C0F774584E}" type="datetimeFigureOut">
               <a:rPr lang="de-DE" smtClean="0"/>
-              <a:t>27.11.2015</a:t>
+              <a:t>02.12.2015</a:t>
             </a:fld>
             <a:endParaRPr lang="de-DE"/>
           </a:p>
@@ -2572,7 +2572,7 @@
           <a:p>
             <a:fld id="{1EEAD7B0-9864-4916-91ED-B8C0F774584E}" type="datetimeFigureOut">
               <a:rPr lang="de-DE" smtClean="0"/>
-              <a:t>27.11.2015</a:t>
+              <a:t>02.12.2015</a:t>
             </a:fld>
             <a:endParaRPr lang="de-DE"/>
           </a:p>
@@ -3234,7 +3234,7 @@
         <p:spPr>
           <a:xfrm>
             <a:off x="3088983" y="623206"/>
-            <a:ext cx="4788071" cy="867458"/>
+            <a:ext cx="5453655" cy="867458"/>
           </a:xfrm>
           <a:prstGeom prst="rect">
             <a:avLst/>
@@ -3327,8 +3327,21 @@
             </a:r>
             <a:r>
               <a:rPr lang="de-DE" sz="2400" dirty="0" smtClean="0"/>
-              <a:t> (oval)</a:t>
-            </a:r>
+              <a:t> </a:t>
+            </a:r>
+            <a:r>
+              <a:rPr lang="de-DE" sz="2400" dirty="0" smtClean="0"/>
+              <a:t>(</a:t>
+            </a:r>
+            <a:r>
+              <a:rPr lang="de-DE" sz="2400" dirty="0" err="1" smtClean="0"/>
+              <a:t>rectangle</a:t>
+            </a:r>
+            <a:r>
+              <a:rPr lang="de-DE" sz="2400" dirty="0" smtClean="0"/>
+              <a:t>)</a:t>
+            </a:r>
+            <a:endParaRPr lang="de-DE" sz="2400" dirty="0" smtClean="0"/>
           </a:p>
         </p:txBody>
       </p:sp>

</xml_diff>